<commit_message>
added picture to assets folder and linked it to index.html
</commit_message>
<xml_diff>
--- a/EZ Fit Tracker.pptx
+++ b/EZ Fit Tracker.pptx
@@ -10,7 +10,8 @@
     <p:sldId id="258" r:id="rId4"/>
     <p:sldId id="259" r:id="rId5"/>
     <p:sldId id="260" r:id="rId6"/>
-    <p:sldId id="261" r:id="rId7"/>
+    <p:sldId id="262" r:id="rId7"/>
+    <p:sldId id="261" r:id="rId8"/>
   </p:sldIdLst>
   <p:sldSz cx="12192000" cy="6858000"/>
   <p:notesSz cx="6858000" cy="9144000"/>
@@ -109,6 +110,11 @@
       </a:defRPr>
     </a:lvl9pPr>
   </p:defaultTextStyle>
+  <p:extLst>
+    <p:ext uri="{EFAFB233-063F-42B5-8137-9DF3F51BA10A}">
+      <p15:sldGuideLst xmlns:p15="http://schemas.microsoft.com/office/powerpoint/2012/main"/>
+    </p:ext>
+  </p:extLst>
 </p:presentation>
 </file>
 
@@ -440,7 +446,7 @@
             <a:pPr algn="l"/>
             <a:fld id="{0DCFB061-4267-4D9F-8017-6F550D3068DF}" type="datetime1">
               <a:rPr lang="en-US" smtClean="0"/>
-              <a:t>3/24/2021</a:t>
+              <a:t>3/25/2021</a:t>
             </a:fld>
             <a:endParaRPr lang="en-US" dirty="0"/>
           </a:p>
@@ -633,7 +639,7 @@
           <a:p>
             <a:fld id="{8141BC61-5547-4A60-8DA1-6699760D9972}" type="datetime1">
               <a:rPr lang="en-US" smtClean="0"/>
-              <a:t>3/24/2021</a:t>
+              <a:t>3/25/2021</a:t>
             </a:fld>
             <a:endParaRPr lang="en-US" dirty="0"/>
           </a:p>
@@ -818,7 +824,7 @@
           <a:p>
             <a:fld id="{24B9D1C6-60D0-4CD1-8F31-F912522EB041}" type="datetime1">
               <a:rPr lang="en-US" smtClean="0"/>
-              <a:t>3/24/2021</a:t>
+              <a:t>3/25/2021</a:t>
             </a:fld>
             <a:endParaRPr lang="en-US" dirty="0"/>
           </a:p>
@@ -1047,7 +1053,7 @@
           <a:p>
             <a:fld id="{47A4ED5C-5A53-433E-8A55-46F54CE81DA5}" type="datetime1">
               <a:rPr lang="en-US" smtClean="0"/>
-              <a:t>3/24/2021</a:t>
+              <a:t>3/25/2021</a:t>
             </a:fld>
             <a:endParaRPr lang="en-US" dirty="0"/>
           </a:p>
@@ -1374,7 +1380,7 @@
           <a:p>
             <a:fld id="{29CABC0C-B6DF-45E9-B954-11C99AA62C3E}" type="datetime1">
               <a:rPr lang="en-US" smtClean="0"/>
-              <a:t>3/24/2021</a:t>
+              <a:t>3/25/2021</a:t>
             </a:fld>
             <a:endParaRPr lang="en-US" dirty="0"/>
           </a:p>
@@ -1670,7 +1676,7 @@
           <a:p>
             <a:fld id="{A4AB71B9-2624-4F21-93EE-35A78B1A0DAD}" type="datetime1">
               <a:rPr lang="en-US" smtClean="0"/>
-              <a:t>3/24/2021</a:t>
+              <a:t>3/25/2021</a:t>
             </a:fld>
             <a:endParaRPr lang="en-US" dirty="0"/>
           </a:p>
@@ -2091,7 +2097,7 @@
           <a:p>
             <a:fld id="{36D37C2A-BE2E-4840-A907-3254E2916C96}" type="datetime1">
               <a:rPr lang="en-US" smtClean="0"/>
-              <a:t>3/24/2021</a:t>
+              <a:t>3/25/2021</a:t>
             </a:fld>
             <a:endParaRPr lang="en-US" dirty="0"/>
           </a:p>
@@ -2289,7 +2295,7 @@
           <a:p>
             <a:fld id="{005CD215-1C45-48A0-8534-39FFE8A7C95A}" type="datetime1">
               <a:rPr lang="en-US" smtClean="0"/>
-              <a:t>3/24/2021</a:t>
+              <a:t>3/25/2021</a:t>
             </a:fld>
             <a:endParaRPr lang="en-US" dirty="0"/>
           </a:p>
@@ -2398,7 +2404,7 @@
           <a:p>
             <a:fld id="{D3363A0F-DEF3-4134-98D0-2E1276938A8B}" type="datetime1">
               <a:rPr lang="en-US" smtClean="0"/>
-              <a:t>3/24/2021</a:t>
+              <a:t>3/25/2021</a:t>
             </a:fld>
             <a:endParaRPr lang="en-US" dirty="0"/>
           </a:p>
@@ -2819,7 +2825,7 @@
           <a:p>
             <a:fld id="{61A2E4C8-2960-4ADD-862C-4D9643CB15AC}" type="datetime1">
               <a:rPr lang="en-US" smtClean="0"/>
-              <a:t>3/24/2021</a:t>
+              <a:t>3/25/2021</a:t>
             </a:fld>
             <a:endParaRPr lang="en-US" dirty="0"/>
           </a:p>
@@ -3172,7 +3178,7 @@
           <a:p>
             <a:fld id="{48BDEA15-09CD-4275-A8E0-385C965F48B0}" type="datetime1">
               <a:rPr lang="en-US" smtClean="0"/>
-              <a:t>3/24/2021</a:t>
+              <a:t>3/25/2021</a:t>
             </a:fld>
             <a:endParaRPr lang="en-US" dirty="0"/>
           </a:p>
@@ -3477,7 +3483,7 @@
           <a:p>
             <a:fld id="{4AF8082C-0922-4249-A612-B415F5231620}" type="datetime1">
               <a:rPr lang="en-US" smtClean="0"/>
-              <a:t>3/24/2021</a:t>
+              <a:t>3/25/2021</a:t>
             </a:fld>
             <a:endParaRPr lang="en-US" dirty="0"/>
           </a:p>
@@ -5187,7 +5193,7 @@
           <a:p>
             <a:r>
               <a:rPr lang="en-US" dirty="0"/>
-              <a:t>Clients who use EZ Fit Tracker have the intention to build a better lifestyle center around health and workout. This application can help clients keep track of meal planning, workout regiments, as well as weather forecasting. We’ve also included a BMI calculator to measure body mass.</a:t>
+              <a:t>Clients who use EZ Fit Tracker have the intention to build a better lifestyle centered around a healthy diet and exercise. This application can help clients keep track of caloric intake, workout options, as well as BMI calculations.</a:t>
             </a:r>
           </a:p>
         </p:txBody>
@@ -5806,15 +5812,7 @@
           <a:p>
             <a:r>
               <a:rPr lang="en-US" dirty="0"/>
-              <a:t>We used </a:t>
-            </a:r>
-            <a:r>
-              <a:rPr lang="en-US" dirty="0" err="1"/>
-              <a:t>Javascript</a:t>
-            </a:r>
-            <a:r>
-              <a:rPr lang="en-US" dirty="0"/>
-              <a:t> to create a simple body mass index calculator.</a:t>
+              <a:t>We used JavaScript to create a simple body mass index calculator.</a:t>
             </a:r>
           </a:p>
         </p:txBody>
@@ -7071,6 +7069,669 @@
 </file>
 
 <file path=ppt/slides/slide6.xml><?xml version="1.0" encoding="utf-8"?>
+<p:sld xmlns:a="http://schemas.openxmlformats.org/drawingml/2006/main" xmlns:r="http://schemas.openxmlformats.org/officeDocument/2006/relationships" xmlns:p="http://schemas.openxmlformats.org/presentationml/2006/main">
+  <p:cSld>
+    <p:bg>
+      <p:bgPr>
+        <a:solidFill>
+          <a:schemeClr val="bg2"/>
+        </a:solidFill>
+        <a:effectLst/>
+      </p:bgPr>
+    </p:bg>
+    <p:spTree>
+      <p:nvGrpSpPr>
+        <p:cNvPr id="1" name=""/>
+        <p:cNvGrpSpPr/>
+        <p:nvPr/>
+      </p:nvGrpSpPr>
+      <p:grpSpPr>
+        <a:xfrm>
+          <a:off x="0" y="0"/>
+          <a:ext cx="0" cy="0"/>
+          <a:chOff x="0" y="0"/>
+          <a:chExt cx="0" cy="0"/>
+        </a:xfrm>
+      </p:grpSpPr>
+      <p:sp useBgFill="1">
+        <p:nvSpPr>
+          <p:cNvPr id="8" name="Rectangle 7">
+            <a:extLst>
+              <a:ext uri="{FF2B5EF4-FFF2-40B4-BE49-F238E27FC236}">
+                <a16:creationId xmlns:a16="http://schemas.microsoft.com/office/drawing/2014/main" id="{099405E2-1A96-4DBA-A9DC-4C2A1B421CA9}"/>
+              </a:ext>
+              <a:ext uri="{C183D7F6-B498-43B3-948B-1728B52AA6E4}">
+                <adec:decorative xmlns:adec="http://schemas.microsoft.com/office/drawing/2017/decorative" val="1"/>
+              </a:ext>
+            </a:extLst>
+          </p:cNvPr>
+          <p:cNvSpPr>
+            <a:spLocks noGrp="1" noRot="1" noChangeAspect="1" noMove="1" noResize="1" noEditPoints="1" noAdjustHandles="1" noChangeArrowheads="1" noChangeShapeType="1" noTextEdit="1"/>
+          </p:cNvSpPr>
+          <p:nvPr>
+            <p:extLst>
+              <p:ext uri="{386F3935-93C4-4BCD-93E2-E3B085C9AB24}">
+                <p16:designElem xmlns:p16="http://schemas.microsoft.com/office/powerpoint/2015/main" val="1"/>
+              </p:ext>
+            </p:extLst>
+          </p:nvPr>
+        </p:nvSpPr>
+        <p:spPr>
+          <a:xfrm flipH="1">
+            <a:off x="0" y="0"/>
+            <a:ext cx="12192001" cy="6858000"/>
+          </a:xfrm>
+          <a:prstGeom prst="rect">
+            <a:avLst/>
+          </a:prstGeom>
+          <a:ln>
+            <a:noFill/>
+          </a:ln>
+        </p:spPr>
+        <p:style>
+          <a:lnRef idx="2">
+            <a:schemeClr val="accent1">
+              <a:shade val="50000"/>
+            </a:schemeClr>
+          </a:lnRef>
+          <a:fillRef idx="1">
+            <a:schemeClr val="accent1"/>
+          </a:fillRef>
+          <a:effectRef idx="0">
+            <a:schemeClr val="accent1"/>
+          </a:effectRef>
+          <a:fontRef idx="minor">
+            <a:schemeClr val="lt1"/>
+          </a:fontRef>
+        </p:style>
+        <p:txBody>
+          <a:bodyPr rtlCol="0" anchor="ctr"/>
+          <a:lstStyle/>
+          <a:p>
+            <a:pPr algn="ctr"/>
+            <a:endParaRPr lang="en-US" dirty="0"/>
+          </a:p>
+        </p:txBody>
+      </p:sp>
+      <p:sp>
+        <p:nvSpPr>
+          <p:cNvPr id="10" name="Rectangle 9">
+            <a:extLst>
+              <a:ext uri="{FF2B5EF4-FFF2-40B4-BE49-F238E27FC236}">
+                <a16:creationId xmlns:a16="http://schemas.microsoft.com/office/drawing/2014/main" id="{6186DD79-F4CA-4DD7-9C78-AC180665FA3C}"/>
+              </a:ext>
+              <a:ext uri="{C183D7F6-B498-43B3-948B-1728B52AA6E4}">
+                <adec:decorative xmlns:adec="http://schemas.microsoft.com/office/drawing/2017/decorative" val="1"/>
+              </a:ext>
+            </a:extLst>
+          </p:cNvPr>
+          <p:cNvSpPr>
+            <a:spLocks noGrp="1" noRot="1" noChangeAspect="1" noMove="1" noResize="1" noEditPoints="1" noAdjustHandles="1" noChangeArrowheads="1" noChangeShapeType="1" noTextEdit="1"/>
+          </p:cNvSpPr>
+          <p:nvPr>
+            <p:extLst>
+              <p:ext uri="{386F3935-93C4-4BCD-93E2-E3B085C9AB24}">
+                <p16:designElem xmlns:p16="http://schemas.microsoft.com/office/powerpoint/2015/main" val="1"/>
+              </p:ext>
+            </p:extLst>
+          </p:nvPr>
+        </p:nvSpPr>
+        <p:spPr>
+          <a:xfrm flipH="1">
+            <a:off x="0" y="1495508"/>
+            <a:ext cx="4426072" cy="4368063"/>
+          </a:xfrm>
+          <a:prstGeom prst="rect">
+            <a:avLst/>
+          </a:prstGeom>
+          <a:solidFill>
+            <a:schemeClr val="tx2"/>
+          </a:solidFill>
+          <a:ln>
+            <a:noFill/>
+          </a:ln>
+        </p:spPr>
+        <p:style>
+          <a:lnRef idx="2">
+            <a:schemeClr val="accent1">
+              <a:shade val="50000"/>
+            </a:schemeClr>
+          </a:lnRef>
+          <a:fillRef idx="1">
+            <a:schemeClr val="accent1"/>
+          </a:fillRef>
+          <a:effectRef idx="0">
+            <a:schemeClr val="accent1"/>
+          </a:effectRef>
+          <a:fontRef idx="minor">
+            <a:schemeClr val="lt1"/>
+          </a:fontRef>
+        </p:style>
+        <p:txBody>
+          <a:bodyPr rtlCol="0" anchor="ctr"/>
+          <a:lstStyle/>
+          <a:p>
+            <a:pPr algn="ctr"/>
+            <a:endParaRPr lang="en-US"/>
+          </a:p>
+        </p:txBody>
+      </p:sp>
+      <p:sp>
+        <p:nvSpPr>
+          <p:cNvPr id="2" name="Title 1">
+            <a:extLst>
+              <a:ext uri="{FF2B5EF4-FFF2-40B4-BE49-F238E27FC236}">
+                <a16:creationId xmlns:a16="http://schemas.microsoft.com/office/drawing/2014/main" id="{205A5BA2-5256-4884-A8BF-88188BA068E3}"/>
+              </a:ext>
+            </a:extLst>
+          </p:cNvPr>
+          <p:cNvSpPr>
+            <a:spLocks noGrp="1"/>
+          </p:cNvSpPr>
+          <p:nvPr>
+            <p:ph type="title"/>
+          </p:nvPr>
+        </p:nvSpPr>
+        <p:spPr>
+          <a:xfrm>
+            <a:off x="642918" y="1952825"/>
+            <a:ext cx="3411973" cy="3635693"/>
+          </a:xfrm>
+        </p:spPr>
+        <p:txBody>
+          <a:bodyPr>
+            <a:normAutofit/>
+          </a:bodyPr>
+          <a:lstStyle/>
+          <a:p>
+            <a:r>
+              <a:rPr lang="en-US" sz="2500" dirty="0">
+                <a:solidFill>
+                  <a:schemeClr val="bg1"/>
+                </a:solidFill>
+              </a:rPr>
+              <a:t>FUTURE ENHANCEMENTS</a:t>
+            </a:r>
+          </a:p>
+        </p:txBody>
+      </p:sp>
+      <p:sp>
+        <p:nvSpPr>
+          <p:cNvPr id="12" name="Rectangle 11">
+            <a:extLst>
+              <a:ext uri="{FF2B5EF4-FFF2-40B4-BE49-F238E27FC236}">
+                <a16:creationId xmlns:a16="http://schemas.microsoft.com/office/drawing/2014/main" id="{BCF4857D-F003-4CA1-82AB-00900B1008BA}"/>
+              </a:ext>
+              <a:ext uri="{C183D7F6-B498-43B3-948B-1728B52AA6E4}">
+                <adec:decorative xmlns:adec="http://schemas.microsoft.com/office/drawing/2017/decorative" val="1"/>
+              </a:ext>
+            </a:extLst>
+          </p:cNvPr>
+          <p:cNvSpPr>
+            <a:spLocks noGrp="1" noRot="1" noChangeAspect="1" noMove="1" noResize="1" noEditPoints="1" noAdjustHandles="1" noChangeArrowheads="1" noChangeShapeType="1" noTextEdit="1"/>
+          </p:cNvSpPr>
+          <p:nvPr>
+            <p:extLst>
+              <p:ext uri="{386F3935-93C4-4BCD-93E2-E3B085C9AB24}">
+                <p16:designElem xmlns:p16="http://schemas.microsoft.com/office/powerpoint/2015/main" val="1"/>
+              </p:ext>
+            </p:extLst>
+          </p:nvPr>
+        </p:nvSpPr>
+        <p:spPr>
+          <a:xfrm flipH="1">
+            <a:off x="0" y="-1"/>
+            <a:ext cx="4426072" cy="1514475"/>
+          </a:xfrm>
+          <a:prstGeom prst="rect">
+            <a:avLst/>
+          </a:prstGeom>
+          <a:solidFill>
+            <a:schemeClr val="bg2">
+              <a:lumMod val="90000"/>
+            </a:schemeClr>
+          </a:solidFill>
+          <a:ln>
+            <a:noFill/>
+          </a:ln>
+        </p:spPr>
+        <p:style>
+          <a:lnRef idx="2">
+            <a:schemeClr val="accent1">
+              <a:shade val="50000"/>
+            </a:schemeClr>
+          </a:lnRef>
+          <a:fillRef idx="1">
+            <a:schemeClr val="accent1"/>
+          </a:fillRef>
+          <a:effectRef idx="0">
+            <a:schemeClr val="accent1"/>
+          </a:effectRef>
+          <a:fontRef idx="minor">
+            <a:schemeClr val="lt1"/>
+          </a:fontRef>
+        </p:style>
+        <p:txBody>
+          <a:bodyPr rtlCol="0" anchor="ctr"/>
+          <a:lstStyle/>
+          <a:p>
+            <a:pPr algn="ctr"/>
+            <a:endParaRPr lang="en-US"/>
+          </a:p>
+        </p:txBody>
+      </p:sp>
+      <p:sp>
+        <p:nvSpPr>
+          <p:cNvPr id="14" name="Rectangle 13">
+            <a:extLst>
+              <a:ext uri="{FF2B5EF4-FFF2-40B4-BE49-F238E27FC236}">
+                <a16:creationId xmlns:a16="http://schemas.microsoft.com/office/drawing/2014/main" id="{79855050-A75B-4DD0-9B56-8B1C7722D884}"/>
+              </a:ext>
+              <a:ext uri="{C183D7F6-B498-43B3-948B-1728B52AA6E4}">
+                <adec:decorative xmlns:adec="http://schemas.microsoft.com/office/drawing/2017/decorative" val="1"/>
+              </a:ext>
+            </a:extLst>
+          </p:cNvPr>
+          <p:cNvSpPr>
+            <a:spLocks noGrp="1" noRot="1" noChangeAspect="1" noMove="1" noResize="1" noEditPoints="1" noAdjustHandles="1" noChangeArrowheads="1" noChangeShapeType="1" noTextEdit="1"/>
+          </p:cNvSpPr>
+          <p:nvPr>
+            <p:extLst>
+              <p:ext uri="{386F3935-93C4-4BCD-93E2-E3B085C9AB24}">
+                <p16:designElem xmlns:p16="http://schemas.microsoft.com/office/powerpoint/2015/main" val="1"/>
+              </p:ext>
+            </p:extLst>
+          </p:nvPr>
+        </p:nvSpPr>
+        <p:spPr>
+          <a:xfrm flipH="1">
+            <a:off x="4426076" y="1514475"/>
+            <a:ext cx="7765922" cy="4356996"/>
+          </a:xfrm>
+          <a:prstGeom prst="rect">
+            <a:avLst/>
+          </a:prstGeom>
+          <a:solidFill>
+            <a:schemeClr val="bg1">
+              <a:alpha val="75000"/>
+            </a:schemeClr>
+          </a:solidFill>
+          <a:ln>
+            <a:noFill/>
+          </a:ln>
+        </p:spPr>
+        <p:style>
+          <a:lnRef idx="2">
+            <a:schemeClr val="accent1">
+              <a:shade val="50000"/>
+            </a:schemeClr>
+          </a:lnRef>
+          <a:fillRef idx="1">
+            <a:schemeClr val="accent1"/>
+          </a:fillRef>
+          <a:effectRef idx="0">
+            <a:schemeClr val="accent1"/>
+          </a:effectRef>
+          <a:fontRef idx="minor">
+            <a:schemeClr val="lt1"/>
+          </a:fontRef>
+        </p:style>
+        <p:txBody>
+          <a:bodyPr rtlCol="0" anchor="ctr"/>
+          <a:lstStyle/>
+          <a:p>
+            <a:pPr algn="ctr"/>
+            <a:endParaRPr lang="en-US"/>
+          </a:p>
+        </p:txBody>
+      </p:sp>
+      <p:sp>
+        <p:nvSpPr>
+          <p:cNvPr id="16" name="Rectangle 15">
+            <a:extLst>
+              <a:ext uri="{FF2B5EF4-FFF2-40B4-BE49-F238E27FC236}">
+                <a16:creationId xmlns:a16="http://schemas.microsoft.com/office/drawing/2014/main" id="{5E6738EB-6FF0-4AF9-8462-57F4494B88B2}"/>
+              </a:ext>
+              <a:ext uri="{C183D7F6-B498-43B3-948B-1728B52AA6E4}">
+                <adec:decorative xmlns:adec="http://schemas.microsoft.com/office/drawing/2017/decorative" val="1"/>
+              </a:ext>
+            </a:extLst>
+          </p:cNvPr>
+          <p:cNvSpPr>
+            <a:spLocks noGrp="1" noRot="1" noChangeAspect="1" noMove="1" noResize="1" noEditPoints="1" noAdjustHandles="1" noChangeArrowheads="1" noChangeShapeType="1" noTextEdit="1"/>
+          </p:cNvSpPr>
+          <p:nvPr>
+            <p:extLst>
+              <p:ext uri="{386F3935-93C4-4BCD-93E2-E3B085C9AB24}">
+                <p16:designElem xmlns:p16="http://schemas.microsoft.com/office/powerpoint/2015/main" val="1"/>
+              </p:ext>
+            </p:extLst>
+          </p:nvPr>
+        </p:nvSpPr>
+        <p:spPr>
+          <a:xfrm>
+            <a:off x="1525" y="1501324"/>
+            <a:ext cx="12188951" cy="64008"/>
+          </a:xfrm>
+          <a:prstGeom prst="rect">
+            <a:avLst/>
+          </a:prstGeom>
+          <a:solidFill>
+            <a:schemeClr val="tx2"/>
+          </a:solidFill>
+          <a:ln>
+            <a:noFill/>
+          </a:ln>
+        </p:spPr>
+        <p:style>
+          <a:lnRef idx="2">
+            <a:schemeClr val="accent1">
+              <a:shade val="50000"/>
+            </a:schemeClr>
+          </a:lnRef>
+          <a:fillRef idx="1">
+            <a:schemeClr val="accent1"/>
+          </a:fillRef>
+          <a:effectRef idx="0">
+            <a:schemeClr val="accent1"/>
+          </a:effectRef>
+          <a:fontRef idx="minor">
+            <a:schemeClr val="lt1"/>
+          </a:fontRef>
+        </p:style>
+        <p:txBody>
+          <a:bodyPr rtlCol="0" anchor="ctr"/>
+          <a:lstStyle/>
+          <a:p>
+            <a:pPr algn="ctr"/>
+            <a:endParaRPr lang="en-US"/>
+          </a:p>
+        </p:txBody>
+      </p:sp>
+      <p:sp>
+        <p:nvSpPr>
+          <p:cNvPr id="18" name="Rectangle 17">
+            <a:extLst>
+              <a:ext uri="{FF2B5EF4-FFF2-40B4-BE49-F238E27FC236}">
+                <a16:creationId xmlns:a16="http://schemas.microsoft.com/office/drawing/2014/main" id="{DB791336-FCAA-4174-9303-B3F374861110}"/>
+              </a:ext>
+              <a:ext uri="{C183D7F6-B498-43B3-948B-1728B52AA6E4}">
+                <adec:decorative xmlns:adec="http://schemas.microsoft.com/office/drawing/2017/decorative" val="1"/>
+              </a:ext>
+            </a:extLst>
+          </p:cNvPr>
+          <p:cNvSpPr>
+            <a:spLocks noGrp="1" noRot="1" noChangeAspect="1" noMove="1" noResize="1" noEditPoints="1" noAdjustHandles="1" noChangeArrowheads="1" noChangeShapeType="1" noTextEdit="1"/>
+          </p:cNvSpPr>
+          <p:nvPr>
+            <p:extLst>
+              <p:ext uri="{386F3935-93C4-4BCD-93E2-E3B085C9AB24}">
+                <p16:designElem xmlns:p16="http://schemas.microsoft.com/office/powerpoint/2015/main" val="1"/>
+              </p:ext>
+            </p:extLst>
+          </p:nvPr>
+        </p:nvSpPr>
+        <p:spPr>
+          <a:xfrm flipH="1">
+            <a:off x="-3051" y="5863306"/>
+            <a:ext cx="12192001" cy="994694"/>
+          </a:xfrm>
+          <a:prstGeom prst="rect">
+            <a:avLst/>
+          </a:prstGeom>
+          <a:solidFill>
+            <a:schemeClr val="bg1">
+              <a:alpha val="75000"/>
+            </a:schemeClr>
+          </a:solidFill>
+          <a:ln>
+            <a:noFill/>
+          </a:ln>
+        </p:spPr>
+        <p:style>
+          <a:lnRef idx="2">
+            <a:schemeClr val="accent1">
+              <a:shade val="50000"/>
+            </a:schemeClr>
+          </a:lnRef>
+          <a:fillRef idx="1">
+            <a:schemeClr val="accent1"/>
+          </a:fillRef>
+          <a:effectRef idx="0">
+            <a:schemeClr val="accent1"/>
+          </a:effectRef>
+          <a:fontRef idx="minor">
+            <a:schemeClr val="lt1"/>
+          </a:fontRef>
+        </p:style>
+        <p:txBody>
+          <a:bodyPr rtlCol="0" anchor="ctr"/>
+          <a:lstStyle/>
+          <a:p>
+            <a:pPr algn="ctr"/>
+            <a:endParaRPr lang="en-US"/>
+          </a:p>
+        </p:txBody>
+      </p:sp>
+      <p:sp>
+        <p:nvSpPr>
+          <p:cNvPr id="20" name="Rectangle 19">
+            <a:extLst>
+              <a:ext uri="{FF2B5EF4-FFF2-40B4-BE49-F238E27FC236}">
+                <a16:creationId xmlns:a16="http://schemas.microsoft.com/office/drawing/2014/main" id="{CA212158-300D-44D0-9CCE-472C3F669EE1}"/>
+              </a:ext>
+              <a:ext uri="{C183D7F6-B498-43B3-948B-1728B52AA6E4}">
+                <adec:decorative xmlns:adec="http://schemas.microsoft.com/office/drawing/2017/decorative" val="1"/>
+              </a:ext>
+            </a:extLst>
+          </p:cNvPr>
+          <p:cNvSpPr>
+            <a:spLocks noGrp="1" noRot="1" noChangeAspect="1" noMove="1" noResize="1" noEditPoints="1" noAdjustHandles="1" noChangeArrowheads="1" noChangeShapeType="1" noTextEdit="1"/>
+          </p:cNvSpPr>
+          <p:nvPr>
+            <p:extLst>
+              <p:ext uri="{386F3935-93C4-4BCD-93E2-E3B085C9AB24}">
+                <p16:designElem xmlns:p16="http://schemas.microsoft.com/office/powerpoint/2015/main" val="1"/>
+              </p:ext>
+            </p:extLst>
+          </p:nvPr>
+        </p:nvSpPr>
+        <p:spPr>
+          <a:xfrm>
+            <a:off x="1525" y="5807463"/>
+            <a:ext cx="12188951" cy="64008"/>
+          </a:xfrm>
+          <a:prstGeom prst="rect">
+            <a:avLst/>
+          </a:prstGeom>
+          <a:solidFill>
+            <a:schemeClr val="tx2"/>
+          </a:solidFill>
+          <a:ln>
+            <a:noFill/>
+          </a:ln>
+        </p:spPr>
+        <p:style>
+          <a:lnRef idx="2">
+            <a:schemeClr val="accent1">
+              <a:shade val="50000"/>
+            </a:schemeClr>
+          </a:lnRef>
+          <a:fillRef idx="1">
+            <a:schemeClr val="accent1"/>
+          </a:fillRef>
+          <a:effectRef idx="0">
+            <a:schemeClr val="accent1"/>
+          </a:effectRef>
+          <a:fontRef idx="minor">
+            <a:schemeClr val="lt1"/>
+          </a:fontRef>
+        </p:style>
+        <p:txBody>
+          <a:bodyPr rtlCol="0" anchor="ctr"/>
+          <a:lstStyle/>
+          <a:p>
+            <a:pPr algn="ctr"/>
+            <a:endParaRPr lang="en-US"/>
+          </a:p>
+        </p:txBody>
+      </p:sp>
+      <p:sp>
+        <p:nvSpPr>
+          <p:cNvPr id="22" name="Rectangle 21">
+            <a:extLst>
+              <a:ext uri="{FF2B5EF4-FFF2-40B4-BE49-F238E27FC236}">
+                <a16:creationId xmlns:a16="http://schemas.microsoft.com/office/drawing/2014/main" id="{988521F4-D44A-42C5-9BDB-5CA25554098B}"/>
+              </a:ext>
+              <a:ext uri="{C183D7F6-B498-43B3-948B-1728B52AA6E4}">
+                <adec:decorative xmlns:adec="http://schemas.microsoft.com/office/drawing/2017/decorative" val="1"/>
+              </a:ext>
+            </a:extLst>
+          </p:cNvPr>
+          <p:cNvSpPr>
+            <a:spLocks noGrp="1" noRot="1" noChangeAspect="1" noMove="1" noResize="1" noEditPoints="1" noAdjustHandles="1" noChangeArrowheads="1" noChangeShapeType="1" noTextEdit="1"/>
+          </p:cNvSpPr>
+          <p:nvPr>
+            <p:extLst>
+              <p:ext uri="{386F3935-93C4-4BCD-93E2-E3B085C9AB24}">
+                <p16:designElem xmlns:p16="http://schemas.microsoft.com/office/powerpoint/2015/main" val="1"/>
+              </p:ext>
+            </p:extLst>
+          </p:nvPr>
+        </p:nvSpPr>
+        <p:spPr>
+          <a:xfrm>
+            <a:off x="4394070" y="0"/>
+            <a:ext cx="64008" cy="6858000"/>
+          </a:xfrm>
+          <a:prstGeom prst="rect">
+            <a:avLst/>
+          </a:prstGeom>
+          <a:solidFill>
+            <a:schemeClr val="tx2"/>
+          </a:solidFill>
+          <a:ln>
+            <a:noFill/>
+          </a:ln>
+        </p:spPr>
+        <p:style>
+          <a:lnRef idx="2">
+            <a:schemeClr val="accent1">
+              <a:shade val="50000"/>
+            </a:schemeClr>
+          </a:lnRef>
+          <a:fillRef idx="1">
+            <a:schemeClr val="accent1"/>
+          </a:fillRef>
+          <a:effectRef idx="0">
+            <a:schemeClr val="accent1"/>
+          </a:effectRef>
+          <a:fontRef idx="minor">
+            <a:schemeClr val="lt1"/>
+          </a:fontRef>
+        </p:style>
+        <p:txBody>
+          <a:bodyPr rtlCol="0" anchor="ctr"/>
+          <a:lstStyle/>
+          <a:p>
+            <a:pPr algn="ctr"/>
+            <a:endParaRPr lang="en-US"/>
+          </a:p>
+        </p:txBody>
+      </p:sp>
+      <p:sp>
+        <p:nvSpPr>
+          <p:cNvPr id="3" name="Content Placeholder 2">
+            <a:extLst>
+              <a:ext uri="{FF2B5EF4-FFF2-40B4-BE49-F238E27FC236}">
+                <a16:creationId xmlns:a16="http://schemas.microsoft.com/office/drawing/2014/main" id="{E7E1EC88-3C51-427C-814E-19A63C2B7271}"/>
+              </a:ext>
+            </a:extLst>
+          </p:cNvPr>
+          <p:cNvSpPr>
+            <a:spLocks noGrp="1"/>
+          </p:cNvSpPr>
+          <p:nvPr>
+            <p:ph idx="1"/>
+          </p:nvPr>
+        </p:nvSpPr>
+        <p:spPr>
+          <a:xfrm>
+            <a:off x="5117909" y="1952825"/>
+            <a:ext cx="6431173" cy="3635693"/>
+          </a:xfrm>
+        </p:spPr>
+        <p:txBody>
+          <a:bodyPr>
+            <a:normAutofit/>
+          </a:bodyPr>
+          <a:lstStyle/>
+          <a:p>
+            <a:pPr marL="285750" indent="-285750">
+              <a:buFont typeface="Arial" panose="020B0604020202020204" pitchFamily="34" charset="0"/>
+              <a:buChar char="•"/>
+            </a:pPr>
+            <a:r>
+              <a:rPr lang="en-US" dirty="0"/>
+              <a:t>Additional workouts</a:t>
+            </a:r>
+          </a:p>
+          <a:p>
+            <a:pPr marL="285750" indent="-285750">
+              <a:buFont typeface="Arial" panose="020B0604020202020204" pitchFamily="34" charset="0"/>
+              <a:buChar char="•"/>
+            </a:pPr>
+            <a:r>
+              <a:rPr lang="en-US" dirty="0"/>
+              <a:t>Saved food searches</a:t>
+            </a:r>
+          </a:p>
+          <a:p>
+            <a:pPr marL="285750" indent="-285750">
+              <a:buFont typeface="Arial" panose="020B0604020202020204" pitchFamily="34" charset="0"/>
+              <a:buChar char="•"/>
+            </a:pPr>
+            <a:r>
+              <a:rPr lang="en-US" dirty="0"/>
+              <a:t>User accounts</a:t>
+            </a:r>
+          </a:p>
+          <a:p>
+            <a:pPr marL="285750" indent="-285750">
+              <a:buFont typeface="Arial" panose="020B0604020202020204" pitchFamily="34" charset="0"/>
+              <a:buChar char="•"/>
+            </a:pPr>
+            <a:r>
+              <a:rPr lang="en-US" dirty="0"/>
+              <a:t>Calorie calculator</a:t>
+            </a:r>
+          </a:p>
+          <a:p>
+            <a:pPr marL="285750" indent="-285750">
+              <a:buFont typeface="Arial" panose="020B0604020202020204" pitchFamily="34" charset="0"/>
+              <a:buChar char="•"/>
+            </a:pPr>
+            <a:r>
+              <a:rPr lang="en-US" dirty="0"/>
+              <a:t>Integration to cell phone camera</a:t>
+            </a:r>
+          </a:p>
+        </p:txBody>
+      </p:sp>
+    </p:spTree>
+    <p:extLst>
+      <p:ext uri="{BB962C8B-B14F-4D97-AF65-F5344CB8AC3E}">
+        <p14:creationId xmlns:p14="http://schemas.microsoft.com/office/powerpoint/2010/main" val="103639675"/>
+      </p:ext>
+    </p:extLst>
+  </p:cSld>
+  <p:clrMapOvr>
+    <a:masterClrMapping/>
+  </p:clrMapOvr>
+</p:sld>
+</file>
+
+<file path=ppt/slides/slide7.xml><?xml version="1.0" encoding="utf-8"?>
 <p:sld xmlns:a="http://schemas.openxmlformats.org/drawingml/2006/main" xmlns:r="http://schemas.openxmlformats.org/officeDocument/2006/relationships" xmlns:p="http://schemas.openxmlformats.org/presentationml/2006/main">
   <p:cSld>
     <p:bg>

</xml_diff>